<commit_message>
swap NHK and MiniApps in 26 Oct agenda
</commit_message>
<xml_diff>
--- a/PRESENTATIONS/2021-10-online-f2f/2021-10-26-WoT-F2F-Opening-McCool.pptx
+++ b/PRESENTATIONS/2021-10-online-f2f/2021-10-26-WoT-F2F-Opening-McCool.pptx
@@ -211,7 +211,7 @@
           <a:p>
             <a:fld id="{8389B5DD-0274-BF45-B4C5-62E173E8F634}" type="datetimeFigureOut">
               <a:rPr lang="en-US" smtClean="0"/>
-              <a:t>10/25/21</a:t>
+              <a:t>10/26/21</a:t>
             </a:fld>
             <a:endParaRPr lang="en-US"/>
           </a:p>
@@ -827,7 +827,7 @@
           <a:p>
             <a:fld id="{2F93E591-CC8D-C74E-8EED-098A7FB5E64D}" type="datetime1">
               <a:rPr lang="en-CA" smtClean="0"/>
-              <a:t>2021-10-25</a:t>
+              <a:t>2021-10-26</a:t>
             </a:fld>
             <a:endParaRPr lang="en-US"/>
           </a:p>
@@ -1095,7 +1095,7 @@
           <a:p>
             <a:fld id="{2E1BC118-574D-594E-ABEA-A7C82666C9AB}" type="datetime1">
               <a:rPr lang="en-CA" smtClean="0"/>
-              <a:t>2021-10-25</a:t>
+              <a:t>2021-10-26</a:t>
             </a:fld>
             <a:endParaRPr lang="en-US"/>
           </a:p>
@@ -1461,7 +1461,7 @@
           <a:p>
             <a:fld id="{B929AB1E-7FD9-0A40-B7C0-508CCACB3E9A}" type="datetime1">
               <a:rPr lang="en-CA" smtClean="0"/>
-              <a:t>2021-10-25</a:t>
+              <a:t>2021-10-26</a:t>
             </a:fld>
             <a:endParaRPr lang="en-US"/>
           </a:p>
@@ -1693,7 +1693,7 @@
           <a:p>
             <a:fld id="{5AE8723F-57EA-4C47-97B9-92AFDEEF85DC}" type="datetime1">
               <a:rPr lang="en-CA" smtClean="0"/>
-              <a:t>2021-10-25</a:t>
+              <a:t>2021-10-26</a:t>
             </a:fld>
             <a:endParaRPr lang="en-US"/>
           </a:p>
@@ -2023,7 +2023,7 @@
           <a:p>
             <a:fld id="{B2B00E5D-EC04-AA49-8D52-0FCB6E08F63D}" type="datetime1">
               <a:rPr lang="en-CA" smtClean="0"/>
-              <a:t>2021-10-25</a:t>
+              <a:t>2021-10-26</a:t>
             </a:fld>
             <a:endParaRPr lang="en-US"/>
           </a:p>
@@ -2496,7 +2496,7 @@
           <a:p>
             <a:fld id="{FF90905C-10FF-8047-AA7E-6DC7E8B6AF51}" type="datetime1">
               <a:rPr lang="en-CA" smtClean="0"/>
-              <a:t>2021-10-25</a:t>
+              <a:t>2021-10-26</a:t>
             </a:fld>
             <a:endParaRPr lang="en-US"/>
           </a:p>
@@ -2702,7 +2702,7 @@
           <a:p>
             <a:fld id="{D1CE86E2-4400-D342-BEEC-F9C1ADF6F9F7}" type="datetime1">
               <a:rPr lang="en-CA" smtClean="0"/>
-              <a:t>2021-10-25</a:t>
+              <a:t>2021-10-26</a:t>
             </a:fld>
             <a:endParaRPr lang="en-US"/>
           </a:p>
@@ -2872,7 +2872,7 @@
           <a:p>
             <a:fld id="{74358A08-7221-7F45-8378-69D5559861DD}" type="datetime1">
               <a:rPr lang="en-CA" smtClean="0"/>
-              <a:t>2021-10-25</a:t>
+              <a:t>2021-10-26</a:t>
             </a:fld>
             <a:endParaRPr lang="en-US"/>
           </a:p>
@@ -3244,7 +3244,7 @@
           <a:p>
             <a:fld id="{08C20FDB-303D-8A4E-83B7-226DD88B97BD}" type="datetime1">
               <a:rPr lang="en-CA" smtClean="0"/>
-              <a:t>2021-10-25</a:t>
+              <a:t>2021-10-26</a:t>
             </a:fld>
             <a:endParaRPr lang="en-US"/>
           </a:p>
@@ -3596,7 +3596,7 @@
           <a:p>
             <a:fld id="{0A9EBA37-9D18-D34A-A88D-1B00AA06E95C}" type="datetime1">
               <a:rPr lang="en-CA" smtClean="0"/>
-              <a:t>2021-10-25</a:t>
+              <a:t>2021-10-26</a:t>
             </a:fld>
             <a:endParaRPr lang="en-US"/>
           </a:p>
@@ -3936,7 +3936,7 @@
             <a:fld id="{B73A2E78-F38A-E046-ACDB-668F070D1EF6}" type="datetime1">
               <a:rPr lang="en-CA" smtClean="0"/>
               <a:pPr/>
-              <a:t>2021-10-25</a:t>
+              <a:t>2021-10-26</a:t>
             </a:fld>
             <a:endParaRPr lang="en-US" dirty="0"/>
           </a:p>
@@ -4654,7 +4654,7 @@
           <a:p>
             <a:fld id="{BF92DA42-2970-1B4D-9C1F-77F249CD7467}" type="datetime1">
               <a:rPr lang="en-CA" smtClean="0"/>
-              <a:t>2021-10-25</a:t>
+              <a:t>2021-10-26</a:t>
             </a:fld>
             <a:endParaRPr lang="en-US" dirty="0"/>
           </a:p>
@@ -5116,15 +5116,23 @@
             <a:pPr lvl="1"/>
             <a:r>
               <a:rPr lang="de-DE" dirty="0"/>
-              <a:t>Conexxus: 20m; NHK: 20m; </a:t>
+              <a:t>Conexxus: 20m; </a:t>
             </a:r>
             <a:r>
               <a:rPr lang="de-DE" dirty="0" err="1"/>
               <a:t>MiniApps</a:t>
             </a:r>
             <a:r>
+              <a:rPr lang="de-DE"/>
+              <a:t>: 20m; NHK</a:t>
+            </a:r>
+            <a:r>
               <a:rPr lang="de-DE" dirty="0"/>
-              <a:t>: 20m; Digital </a:t>
+              <a:t>: 20m</a:t>
+            </a:r>
+            <a:r>
+              <a:rPr lang="de-DE"/>
+              <a:t>; Digital </a:t>
             </a:r>
             <a:r>
               <a:rPr lang="de-DE" dirty="0" err="1"/>
@@ -5275,7 +5283,7 @@
           <a:p>
             <a:fld id="{B929AB1E-7FD9-0A40-B7C0-508CCACB3E9A}" type="datetime1">
               <a:rPr lang="en-CA" smtClean="0"/>
-              <a:t>2021-10-25</a:t>
+              <a:t>2021-10-26</a:t>
             </a:fld>
             <a:endParaRPr lang="en-US"/>
           </a:p>
@@ -5520,7 +5528,7 @@
           <a:p>
             <a:fld id="{BF92DA42-2970-1B4D-9C1F-77F249CD7467}" type="datetime1">
               <a:rPr lang="en-CA" smtClean="0"/>
-              <a:t>2021-10-25</a:t>
+              <a:t>2021-10-26</a:t>
             </a:fld>
             <a:endParaRPr lang="en-US" dirty="0"/>
           </a:p>

</xml_diff>